<commit_message>
Added the report in docx format and updated the ppt
</commit_message>
<xml_diff>
--- a/pixels_review.pptx
+++ b/pixels_review.pptx
@@ -266,7 +266,7 @@
           <a:p>
             <a:fld id="{78636C12-EB9A-4405-B5CD-E00CD0276C06}" type="datetimeFigureOut">
               <a:rPr lang="en-US" smtClean="0"/>
-              <a:t>11/22/2018</a:t>
+              <a:t>11/27/2018</a:t>
             </a:fld>
             <a:endParaRPr lang="en-US"/>
           </a:p>
@@ -436,7 +436,7 @@
           <a:p>
             <a:fld id="{78636C12-EB9A-4405-B5CD-E00CD0276C06}" type="datetimeFigureOut">
               <a:rPr lang="en-US" smtClean="0"/>
-              <a:t>11/22/2018</a:t>
+              <a:t>11/27/2018</a:t>
             </a:fld>
             <a:endParaRPr lang="en-US"/>
           </a:p>
@@ -616,7 +616,7 @@
           <a:p>
             <a:fld id="{78636C12-EB9A-4405-B5CD-E00CD0276C06}" type="datetimeFigureOut">
               <a:rPr lang="en-US" smtClean="0"/>
-              <a:t>11/22/2018</a:t>
+              <a:t>11/27/2018</a:t>
             </a:fld>
             <a:endParaRPr lang="en-US"/>
           </a:p>
@@ -786,7 +786,7 @@
           <a:p>
             <a:fld id="{78636C12-EB9A-4405-B5CD-E00CD0276C06}" type="datetimeFigureOut">
               <a:rPr lang="en-US" smtClean="0"/>
-              <a:t>11/22/2018</a:t>
+              <a:t>11/27/2018</a:t>
             </a:fld>
             <a:endParaRPr lang="en-US"/>
           </a:p>
@@ -1032,7 +1032,7 @@
           <a:p>
             <a:fld id="{78636C12-EB9A-4405-B5CD-E00CD0276C06}" type="datetimeFigureOut">
               <a:rPr lang="en-US" smtClean="0"/>
-              <a:t>11/22/2018</a:t>
+              <a:t>11/27/2018</a:t>
             </a:fld>
             <a:endParaRPr lang="en-US"/>
           </a:p>
@@ -1264,7 +1264,7 @@
           <a:p>
             <a:fld id="{78636C12-EB9A-4405-B5CD-E00CD0276C06}" type="datetimeFigureOut">
               <a:rPr lang="en-US" smtClean="0"/>
-              <a:t>11/22/2018</a:t>
+              <a:t>11/27/2018</a:t>
             </a:fld>
             <a:endParaRPr lang="en-US"/>
           </a:p>
@@ -1631,7 +1631,7 @@
           <a:p>
             <a:fld id="{78636C12-EB9A-4405-B5CD-E00CD0276C06}" type="datetimeFigureOut">
               <a:rPr lang="en-US" smtClean="0"/>
-              <a:t>11/22/2018</a:t>
+              <a:t>11/27/2018</a:t>
             </a:fld>
             <a:endParaRPr lang="en-US"/>
           </a:p>
@@ -1749,7 +1749,7 @@
           <a:p>
             <a:fld id="{78636C12-EB9A-4405-B5CD-E00CD0276C06}" type="datetimeFigureOut">
               <a:rPr lang="en-US" smtClean="0"/>
-              <a:t>11/22/2018</a:t>
+              <a:t>11/27/2018</a:t>
             </a:fld>
             <a:endParaRPr lang="en-US"/>
           </a:p>
@@ -1844,7 +1844,7 @@
           <a:p>
             <a:fld id="{78636C12-EB9A-4405-B5CD-E00CD0276C06}" type="datetimeFigureOut">
               <a:rPr lang="en-US" smtClean="0"/>
-              <a:t>11/22/2018</a:t>
+              <a:t>11/27/2018</a:t>
             </a:fld>
             <a:endParaRPr lang="en-US"/>
           </a:p>
@@ -2121,7 +2121,7 @@
           <a:p>
             <a:fld id="{78636C12-EB9A-4405-B5CD-E00CD0276C06}" type="datetimeFigureOut">
               <a:rPr lang="en-US" smtClean="0"/>
-              <a:t>11/22/2018</a:t>
+              <a:t>11/27/2018</a:t>
             </a:fld>
             <a:endParaRPr lang="en-US"/>
           </a:p>
@@ -2374,7 +2374,7 @@
           <a:p>
             <a:fld id="{78636C12-EB9A-4405-B5CD-E00CD0276C06}" type="datetimeFigureOut">
               <a:rPr lang="en-US" smtClean="0"/>
-              <a:t>11/22/2018</a:t>
+              <a:t>11/27/2018</a:t>
             </a:fld>
             <a:endParaRPr lang="en-US"/>
           </a:p>
@@ -2587,7 +2587,7 @@
           <a:p>
             <a:fld id="{78636C12-EB9A-4405-B5CD-E00CD0276C06}" type="datetimeFigureOut">
               <a:rPr lang="en-US" smtClean="0"/>
-              <a:t>11/22/2018</a:t>
+              <a:t>11/27/2018</a:t>
             </a:fld>
             <a:endParaRPr lang="en-US"/>
           </a:p>
@@ -3641,13 +3641,7 @@
               <a:rPr lang="en-US" sz="2200" dirty="0" smtClean="0">
                 <a:latin typeface="+mj-lt"/>
               </a:rPr>
-              <a:t>   </a:t>
-            </a:r>
-            <a:r>
-              <a:rPr lang="en-US" sz="2200" dirty="0" smtClean="0">
-                <a:latin typeface="+mj-lt"/>
-              </a:rPr>
-              <a:t>Techniques</a:t>
+              <a:t>   Techniques</a:t>
             </a:r>
           </a:p>
         </p:txBody>
@@ -7140,6 +7134,150 @@
         <p:spPr>
           <a:xfrm>
             <a:off x="8751570" y="2442835"/>
+            <a:ext cx="2434590" cy="430887"/>
+          </a:xfrm>
+          <a:prstGeom prst="rect">
+            <a:avLst/>
+          </a:prstGeom>
+          <a:noFill/>
+        </p:spPr>
+        <p:txBody>
+          <a:bodyPr wrap="square" rtlCol="0">
+            <a:spAutoFit/>
+          </a:bodyPr>
+          <a:lstStyle/>
+          <a:p>
+            <a:r>
+              <a:rPr lang="en-US" sz="2200" dirty="0" smtClean="0">
+                <a:latin typeface="+mj-lt"/>
+              </a:rPr>
+              <a:t>PGSSP, IIIT-H</a:t>
+            </a:r>
+            <a:endParaRPr lang="en-US" sz="2200" dirty="0">
+              <a:latin typeface="+mj-lt"/>
+            </a:endParaRPr>
+          </a:p>
+        </p:txBody>
+      </p:sp>
+      <p:pic>
+        <p:nvPicPr>
+          <p:cNvPr id="9" name="Picture 8"/>
+          <p:cNvPicPr>
+            <a:picLocks noChangeAspect="1"/>
+          </p:cNvPicPr>
+          <p:nvPr/>
+        </p:nvPicPr>
+        <p:blipFill>
+          <a:blip r:embed="rId3" cstate="print">
+            <a:extLst>
+              <a:ext uri="{28A0092B-C50C-407E-A947-70E740481C1C}">
+                <a14:useLocalDpi xmlns:a14="http://schemas.microsoft.com/office/drawing/2010/main" val="0"/>
+              </a:ext>
+            </a:extLst>
+          </a:blip>
+          <a:stretch>
+            <a:fillRect/>
+          </a:stretch>
+        </p:blipFill>
+        <p:spPr>
+          <a:xfrm>
+            <a:off x="6488430" y="3958754"/>
+            <a:ext cx="1799303" cy="1799303"/>
+          </a:xfrm>
+          <a:prstGeom prst="rect">
+            <a:avLst/>
+          </a:prstGeom>
+        </p:spPr>
+      </p:pic>
+      <p:sp>
+        <p:nvSpPr>
+          <p:cNvPr id="10" name="TextBox 9"/>
+          <p:cNvSpPr txBox="1"/>
+          <p:nvPr/>
+        </p:nvSpPr>
+        <p:spPr>
+          <a:xfrm>
+            <a:off x="8761095" y="4245241"/>
+            <a:ext cx="2952750" cy="584775"/>
+          </a:xfrm>
+          <a:prstGeom prst="rect">
+            <a:avLst/>
+          </a:prstGeom>
+          <a:noFill/>
+        </p:spPr>
+        <p:txBody>
+          <a:bodyPr wrap="square" rtlCol="0">
+            <a:spAutoFit/>
+          </a:bodyPr>
+          <a:lstStyle/>
+          <a:p>
+            <a:r>
+              <a:rPr lang="en-US" sz="3200" dirty="0" smtClean="0">
+                <a:latin typeface="+mj-lt"/>
+              </a:rPr>
+              <a:t>Abhishek </a:t>
+            </a:r>
+            <a:r>
+              <a:rPr lang="en-US" sz="3200" dirty="0" err="1" smtClean="0">
+                <a:latin typeface="+mj-lt"/>
+              </a:rPr>
+              <a:t>Tyagi</a:t>
+            </a:r>
+            <a:endParaRPr lang="en-US" sz="3200" dirty="0">
+              <a:latin typeface="+mj-lt"/>
+            </a:endParaRPr>
+          </a:p>
+        </p:txBody>
+      </p:sp>
+      <p:sp>
+        <p:nvSpPr>
+          <p:cNvPr id="11" name="TextBox 10"/>
+          <p:cNvSpPr txBox="1"/>
+          <p:nvPr/>
+        </p:nvSpPr>
+        <p:spPr>
+          <a:xfrm>
+            <a:off x="8770620" y="4796532"/>
+            <a:ext cx="2834640" cy="430887"/>
+          </a:xfrm>
+          <a:prstGeom prst="rect">
+            <a:avLst/>
+          </a:prstGeom>
+          <a:noFill/>
+        </p:spPr>
+        <p:txBody>
+          <a:bodyPr wrap="square" rtlCol="0">
+            <a:spAutoFit/>
+          </a:bodyPr>
+          <a:lstStyle/>
+          <a:p>
+            <a:r>
+              <a:rPr lang="en-US" sz="2200" dirty="0" smtClean="0">
+                <a:latin typeface="+mj-lt"/>
+              </a:rPr>
+              <a:t>UI Lead, </a:t>
+            </a:r>
+            <a:r>
+              <a:rPr lang="en-US" sz="2200" dirty="0" err="1" smtClean="0">
+                <a:latin typeface="+mj-lt"/>
+              </a:rPr>
+              <a:t>Virtusa</a:t>
+            </a:r>
+            <a:endParaRPr lang="en-US" sz="2200" dirty="0">
+              <a:latin typeface="+mj-lt"/>
+            </a:endParaRPr>
+          </a:p>
+        </p:txBody>
+      </p:sp>
+      <p:sp>
+        <p:nvSpPr>
+          <p:cNvPr id="12" name="TextBox 11"/>
+          <p:cNvSpPr txBox="1"/>
+          <p:nvPr/>
+        </p:nvSpPr>
+        <p:spPr>
+          <a:xfrm>
+            <a:off x="8761095" y="5170269"/>
             <a:ext cx="2434590" cy="430887"/>
           </a:xfrm>
           <a:prstGeom prst="rect">

</xml_diff>